<commit_message>
SetupFunction (Missing CosmosDB starter documents)
</commit_message>
<xml_diff>
--- a/MythicalIoT.pptx
+++ b/MythicalIoT.pptx
@@ -202,7 +202,7 @@
           <a:p>
             <a:fld id="{00F9A49F-B39A-6D40-8171-0C8144D2F78C}" type="datetimeFigureOut">
               <a:rPr lang="en-US" smtClean="0"/>
-              <a:t>12/7/20</a:t>
+              <a:t>12/11/20</a:t>
             </a:fld>
             <a:endParaRPr lang="en-US"/>
           </a:p>
@@ -616,7 +616,7 @@
           <a:p>
             <a:fld id="{0010EDA1-2036-5448-A4CE-E7A3E6B521D5}" type="datetimeFigureOut">
               <a:rPr lang="en-US" smtClean="0"/>
-              <a:t>12/7/20</a:t>
+              <a:t>12/11/20</a:t>
             </a:fld>
             <a:endParaRPr lang="en-US"/>
           </a:p>
@@ -814,7 +814,7 @@
           <a:p>
             <a:fld id="{0010EDA1-2036-5448-A4CE-E7A3E6B521D5}" type="datetimeFigureOut">
               <a:rPr lang="en-US" smtClean="0"/>
-              <a:t>12/7/20</a:t>
+              <a:t>12/11/20</a:t>
             </a:fld>
             <a:endParaRPr lang="en-US"/>
           </a:p>
@@ -1022,7 +1022,7 @@
           <a:p>
             <a:fld id="{0010EDA1-2036-5448-A4CE-E7A3E6B521D5}" type="datetimeFigureOut">
               <a:rPr lang="en-US" smtClean="0"/>
-              <a:t>12/7/20</a:t>
+              <a:t>12/11/20</a:t>
             </a:fld>
             <a:endParaRPr lang="en-US"/>
           </a:p>
@@ -1220,7 +1220,7 @@
           <a:p>
             <a:fld id="{0010EDA1-2036-5448-A4CE-E7A3E6B521D5}" type="datetimeFigureOut">
               <a:rPr lang="en-US" smtClean="0"/>
-              <a:t>12/7/20</a:t>
+              <a:t>12/11/20</a:t>
             </a:fld>
             <a:endParaRPr lang="en-US"/>
           </a:p>
@@ -1495,7 +1495,7 @@
           <a:p>
             <a:fld id="{0010EDA1-2036-5448-A4CE-E7A3E6B521D5}" type="datetimeFigureOut">
               <a:rPr lang="en-US" smtClean="0"/>
-              <a:t>12/7/20</a:t>
+              <a:t>12/11/20</a:t>
             </a:fld>
             <a:endParaRPr lang="en-US"/>
           </a:p>
@@ -1760,7 +1760,7 @@
           <a:p>
             <a:fld id="{0010EDA1-2036-5448-A4CE-E7A3E6B521D5}" type="datetimeFigureOut">
               <a:rPr lang="en-US" smtClean="0"/>
-              <a:t>12/7/20</a:t>
+              <a:t>12/11/20</a:t>
             </a:fld>
             <a:endParaRPr lang="en-US"/>
           </a:p>
@@ -2172,7 +2172,7 @@
           <a:p>
             <a:fld id="{0010EDA1-2036-5448-A4CE-E7A3E6B521D5}" type="datetimeFigureOut">
               <a:rPr lang="en-US" smtClean="0"/>
-              <a:t>12/7/20</a:t>
+              <a:t>12/11/20</a:t>
             </a:fld>
             <a:endParaRPr lang="en-US"/>
           </a:p>
@@ -2313,7 +2313,7 @@
           <a:p>
             <a:fld id="{0010EDA1-2036-5448-A4CE-E7A3E6B521D5}" type="datetimeFigureOut">
               <a:rPr lang="en-US" smtClean="0"/>
-              <a:t>12/7/20</a:t>
+              <a:t>12/11/20</a:t>
             </a:fld>
             <a:endParaRPr lang="en-US"/>
           </a:p>
@@ -2426,7 +2426,7 @@
           <a:p>
             <a:fld id="{0010EDA1-2036-5448-A4CE-E7A3E6B521D5}" type="datetimeFigureOut">
               <a:rPr lang="en-US" smtClean="0"/>
-              <a:t>12/7/20</a:t>
+              <a:t>12/11/20</a:t>
             </a:fld>
             <a:endParaRPr lang="en-US"/>
           </a:p>
@@ -2737,7 +2737,7 @@
           <a:p>
             <a:fld id="{0010EDA1-2036-5448-A4CE-E7A3E6B521D5}" type="datetimeFigureOut">
               <a:rPr lang="en-US" smtClean="0"/>
-              <a:t>12/7/20</a:t>
+              <a:t>12/11/20</a:t>
             </a:fld>
             <a:endParaRPr lang="en-US"/>
           </a:p>
@@ -3025,7 +3025,7 @@
           <a:p>
             <a:fld id="{0010EDA1-2036-5448-A4CE-E7A3E6B521D5}" type="datetimeFigureOut">
               <a:rPr lang="en-US" smtClean="0"/>
-              <a:t>12/7/20</a:t>
+              <a:t>12/11/20</a:t>
             </a:fld>
             <a:endParaRPr lang="en-US"/>
           </a:p>
@@ -3266,7 +3266,7 @@
           <a:p>
             <a:fld id="{0010EDA1-2036-5448-A4CE-E7A3E6B521D5}" type="datetimeFigureOut">
               <a:rPr lang="en-US" smtClean="0"/>
-              <a:t>12/7/20</a:t>
+              <a:t>12/11/20</a:t>
             </a:fld>
             <a:endParaRPr lang="en-US"/>
           </a:p>
@@ -11772,6 +11772,189 @@
           </a:prstGeom>
         </p:spPr>
       </p:pic>
+      <p:sp>
+        <p:nvSpPr>
+          <p:cNvPr id="2" name="Rectangle 1">
+            <a:extLst>
+              <a:ext uri="{FF2B5EF4-FFF2-40B4-BE49-F238E27FC236}">
+                <a16:creationId xmlns:a16="http://schemas.microsoft.com/office/drawing/2014/main" id="{E8DB1C8E-3F7E-AB46-94F5-5D2AB3161D2E}"/>
+              </a:ext>
+            </a:extLst>
+          </p:cNvPr>
+          <p:cNvSpPr/>
+          <p:nvPr/>
+        </p:nvSpPr>
+        <p:spPr>
+          <a:xfrm>
+            <a:off x="0" y="577516"/>
+            <a:ext cx="1934678" cy="6280484"/>
+          </a:xfrm>
+          <a:prstGeom prst="rect">
+            <a:avLst/>
+          </a:prstGeom>
+          <a:solidFill>
+            <a:srgbClr val="4472C4">
+              <a:alpha val="50196"/>
+            </a:srgbClr>
+          </a:solidFill>
+        </p:spPr>
+        <p:style>
+          <a:lnRef idx="2">
+            <a:schemeClr val="accent1">
+              <a:shade val="50000"/>
+            </a:schemeClr>
+          </a:lnRef>
+          <a:fillRef idx="1">
+            <a:schemeClr val="accent1"/>
+          </a:fillRef>
+          <a:effectRef idx="0">
+            <a:schemeClr val="accent1"/>
+          </a:effectRef>
+          <a:fontRef idx="minor">
+            <a:schemeClr val="lt1"/>
+          </a:fontRef>
+        </p:style>
+        <p:txBody>
+          <a:bodyPr rtlCol="0" anchor="ctr"/>
+          <a:lstStyle/>
+          <a:p>
+            <a:pPr algn="ctr"/>
+            <a:endParaRPr lang="en-US" dirty="0"/>
+          </a:p>
+        </p:txBody>
+      </p:sp>
+      <p:sp>
+        <p:nvSpPr>
+          <p:cNvPr id="3" name="Rectangle 2">
+            <a:extLst>
+              <a:ext uri="{FF2B5EF4-FFF2-40B4-BE49-F238E27FC236}">
+                <a16:creationId xmlns:a16="http://schemas.microsoft.com/office/drawing/2014/main" id="{C861A087-B93B-2E49-952D-7753CC253FEA}"/>
+              </a:ext>
+            </a:extLst>
+          </p:cNvPr>
+          <p:cNvSpPr/>
+          <p:nvPr/>
+        </p:nvSpPr>
+        <p:spPr>
+          <a:xfrm>
+            <a:off x="189298" y="2047056"/>
+            <a:ext cx="1658754" cy="1569660"/>
+          </a:xfrm>
+          <a:prstGeom prst="rect">
+            <a:avLst/>
+          </a:prstGeom>
+        </p:spPr>
+        <p:txBody>
+          <a:bodyPr wrap="square">
+            <a:spAutoFit/>
+          </a:bodyPr>
+          <a:lstStyle/>
+          <a:p>
+            <a:pPr algn="ctr"/>
+            <a:r>
+              <a:rPr lang="en-US" sz="3200" dirty="0">
+                <a:solidFill>
+                  <a:srgbClr val="FF0000"/>
+                </a:solidFill>
+              </a:rPr>
+              <a:t>List of </a:t>
+            </a:r>
+            <a:br>
+              <a:rPr lang="en-US" sz="3200" dirty="0">
+                <a:solidFill>
+                  <a:srgbClr val="FF0000"/>
+                </a:solidFill>
+              </a:rPr>
+            </a:br>
+            <a:r>
+              <a:rPr lang="en-US" sz="3200" dirty="0">
+                <a:solidFill>
+                  <a:srgbClr val="FF0000"/>
+                </a:solidFill>
+              </a:rPr>
+              <a:t>IoT Edges</a:t>
+            </a:r>
+          </a:p>
+        </p:txBody>
+      </p:sp>
+      <p:sp>
+        <p:nvSpPr>
+          <p:cNvPr id="6" name="Rectangle 5">
+            <a:extLst>
+              <a:ext uri="{FF2B5EF4-FFF2-40B4-BE49-F238E27FC236}">
+                <a16:creationId xmlns:a16="http://schemas.microsoft.com/office/drawing/2014/main" id="{3F310C6B-9F6C-674A-89CE-52C7EBA2680B}"/>
+              </a:ext>
+            </a:extLst>
+          </p:cNvPr>
+          <p:cNvSpPr/>
+          <p:nvPr/>
+        </p:nvSpPr>
+        <p:spPr>
+          <a:xfrm>
+            <a:off x="6241984" y="977047"/>
+            <a:ext cx="2825013" cy="1569660"/>
+          </a:xfrm>
+          <a:prstGeom prst="rect">
+            <a:avLst/>
+          </a:prstGeom>
+        </p:spPr>
+        <p:txBody>
+          <a:bodyPr wrap="square">
+            <a:spAutoFit/>
+          </a:bodyPr>
+          <a:lstStyle/>
+          <a:p>
+            <a:pPr algn="ctr"/>
+            <a:r>
+              <a:rPr lang="en-US" sz="3200" dirty="0">
+                <a:solidFill>
+                  <a:srgbClr val="FF0000"/>
+                </a:solidFill>
+              </a:rPr>
+              <a:t>Modules with Desired Properties</a:t>
+            </a:r>
+          </a:p>
+        </p:txBody>
+      </p:sp>
+      <p:sp>
+        <p:nvSpPr>
+          <p:cNvPr id="8" name="Rectangle 7">
+            <a:extLst>
+              <a:ext uri="{FF2B5EF4-FFF2-40B4-BE49-F238E27FC236}">
+                <a16:creationId xmlns:a16="http://schemas.microsoft.com/office/drawing/2014/main" id="{2B859768-4A81-8C4C-B4E9-7074F268F293}"/>
+              </a:ext>
+            </a:extLst>
+          </p:cNvPr>
+          <p:cNvSpPr/>
+          <p:nvPr/>
+        </p:nvSpPr>
+        <p:spPr>
+          <a:xfrm>
+            <a:off x="4594460" y="4026651"/>
+            <a:ext cx="2825013" cy="584775"/>
+          </a:xfrm>
+          <a:prstGeom prst="rect">
+            <a:avLst/>
+          </a:prstGeom>
+        </p:spPr>
+        <p:txBody>
+          <a:bodyPr wrap="square">
+            <a:spAutoFit/>
+          </a:bodyPr>
+          <a:lstStyle/>
+          <a:p>
+            <a:pPr algn="ctr"/>
+            <a:r>
+              <a:rPr lang="en-US" sz="3200" dirty="0">
+                <a:solidFill>
+                  <a:srgbClr val="FF0000"/>
+                </a:solidFill>
+              </a:rPr>
+              <a:t>Routes</a:t>
+            </a:r>
+          </a:p>
+        </p:txBody>
+      </p:sp>
     </p:spTree>
     <p:extLst>
       <p:ext uri="{BB962C8B-B14F-4D97-AF65-F5344CB8AC3E}">

</xml_diff>